<commit_message>
Updated the web + local app and the presentation
</commit_message>
<xml_diff>
--- a/Documents/הנדסת תוכנה – הצגת פרויקט.pptx
+++ b/Documents/הנדסת תוכנה – הצגת פרויקט.pptx
@@ -209,7 +209,7 @@
           <a:p>
             <a:fld id="{29F79211-537A-420F-A5AE-56227B0148BD}" type="datetimeFigureOut">
               <a:rPr lang="he-IL" smtClean="0"/>
-              <a:t>כ"ז/סיון/תשע"ג</a:t>
+              <a:t>כ"ח/סיון/תשע"ג</a:t>
             </a:fld>
             <a:endParaRPr lang="he-IL"/>
           </a:p>
@@ -827,7 +827,7 @@
           <a:p>
             <a:fld id="{D0CFF994-68CC-44E9-91A6-CFC64472A6C4}" type="datetime8">
               <a:rPr lang="he-IL" smtClean="0"/>
-              <a:t>05 יוני 13</a:t>
+              <a:t>06 יוני 13</a:t>
             </a:fld>
             <a:endParaRPr lang="he-IL"/>
           </a:p>
@@ -984,6 +984,18 @@
   <p:clrMapOvr>
     <a:overrideClrMapping bg1="dk1" tx1="lt1" bg2="dk2" tx2="lt2" accent1="accent1" accent2="accent2" accent3="accent3" accent4="accent4" accent5="accent5" accent6="accent6" hlink="hlink" folHlink="folHlink"/>
   </p:clrMapOvr>
+  <mc:AlternateContent xmlns:mc="http://schemas.openxmlformats.org/markup-compatibility/2006" xmlns:p14="http://schemas.microsoft.com/office/powerpoint/2010/main">
+    <mc:Choice Requires="p14">
+      <p:transition spd="slow" p14:dur="1500">
+        <p:split orient="vert"/>
+      </p:transition>
+    </mc:Choice>
+    <mc:Fallback xmlns="">
+      <p:transition spd="slow">
+        <p:split orient="vert"/>
+      </p:transition>
+    </mc:Fallback>
+  </mc:AlternateContent>
   <p:timing>
     <p:tnLst>
       <p:par>
@@ -1103,7 +1115,7 @@
           <a:p>
             <a:fld id="{2D86E501-65A6-4F8D-8ECA-AAD144491C80}" type="datetime8">
               <a:rPr lang="he-IL" smtClean="0"/>
-              <a:t>05 יוני 13</a:t>
+              <a:t>06 יוני 13</a:t>
             </a:fld>
             <a:endParaRPr lang="he-IL"/>
           </a:p>
@@ -1160,6 +1172,18 @@
   <p:clrMapOvr>
     <a:masterClrMapping/>
   </p:clrMapOvr>
+  <mc:AlternateContent xmlns:mc="http://schemas.openxmlformats.org/markup-compatibility/2006" xmlns:p14="http://schemas.microsoft.com/office/powerpoint/2010/main">
+    <mc:Choice Requires="p14">
+      <p:transition spd="slow" p14:dur="1500">
+        <p:split orient="vert"/>
+      </p:transition>
+    </mc:Choice>
+    <mc:Fallback xmlns="">
+      <p:transition spd="slow">
+        <p:split orient="vert"/>
+      </p:transition>
+    </mc:Fallback>
+  </mc:AlternateContent>
 </p:sldLayout>
 </file>
 
@@ -1381,7 +1405,7 @@
           <a:p>
             <a:fld id="{1A00B35C-F049-4BE0-9A44-1197C15AB997}" type="datetime8">
               <a:rPr lang="he-IL" smtClean="0"/>
-              <a:t>05 יוני 13</a:t>
+              <a:t>06 יוני 13</a:t>
             </a:fld>
             <a:endParaRPr lang="he-IL"/>
           </a:p>
@@ -1490,6 +1514,18 @@
   <p:clrMapOvr>
     <a:overrideClrMapping bg1="lt1" tx1="dk1" bg2="lt2" tx2="dk2" accent1="accent1" accent2="accent2" accent3="accent3" accent4="accent4" accent5="accent5" accent6="accent6" hlink="hlink" folHlink="folHlink"/>
   </p:clrMapOvr>
+  <mc:AlternateContent xmlns:mc="http://schemas.openxmlformats.org/markup-compatibility/2006" xmlns:p14="http://schemas.microsoft.com/office/powerpoint/2010/main">
+    <mc:Choice Requires="p14">
+      <p:transition spd="slow" p14:dur="1500">
+        <p:split orient="vert"/>
+      </p:transition>
+    </mc:Choice>
+    <mc:Fallback xmlns="">
+      <p:transition spd="slow">
+        <p:split orient="vert"/>
+      </p:transition>
+    </mc:Fallback>
+  </mc:AlternateContent>
 </p:sldLayout>
 </file>
 
@@ -1659,6 +1695,18 @@
   <p:clrMapOvr>
     <a:masterClrMapping/>
   </p:clrMapOvr>
+  <mc:AlternateContent xmlns:mc="http://schemas.openxmlformats.org/markup-compatibility/2006" xmlns:p14="http://schemas.microsoft.com/office/powerpoint/2010/main">
+    <mc:Choice Requires="p14">
+      <p:transition spd="slow" p14:dur="1500">
+        <p:split orient="vert"/>
+      </p:transition>
+    </mc:Choice>
+    <mc:Fallback xmlns="">
+      <p:transition spd="slow">
+        <p:split orient="vert"/>
+      </p:transition>
+    </mc:Fallback>
+  </mc:AlternateContent>
   <p:timing>
     <p:tnLst>
       <p:par>
@@ -2000,7 +2048,7 @@
           <a:p>
             <a:fld id="{301E6470-5674-4302-9D77-A1B8A6374200}" type="datetime8">
               <a:rPr lang="he-IL" smtClean="0"/>
-              <a:t>05 יוני 13</a:t>
+              <a:t>06 יוני 13</a:t>
             </a:fld>
             <a:endParaRPr lang="he-IL"/>
           </a:p>
@@ -2155,6 +2203,18 @@
   <p:clrMapOvr>
     <a:overrideClrMapping bg1="lt1" tx1="dk1" bg2="lt2" tx2="dk2" accent1="accent1" accent2="accent2" accent3="accent3" accent4="accent4" accent5="accent5" accent6="accent6" hlink="hlink" folHlink="folHlink"/>
   </p:clrMapOvr>
+  <mc:AlternateContent xmlns:mc="http://schemas.openxmlformats.org/markup-compatibility/2006" xmlns:p14="http://schemas.microsoft.com/office/powerpoint/2010/main">
+    <mc:Choice Requires="p14">
+      <p:transition spd="slow" p14:dur="1500">
+        <p:split orient="vert"/>
+      </p:transition>
+    </mc:Choice>
+    <mc:Fallback xmlns="">
+      <p:transition spd="slow">
+        <p:split orient="vert"/>
+      </p:transition>
+    </mc:Fallback>
+  </mc:AlternateContent>
 </p:sldLayout>
 </file>
 
@@ -2385,7 +2445,7 @@
           <a:p>
             <a:fld id="{FD82E221-041C-44C4-BB9F-67772C965453}" type="datetime8">
               <a:rPr lang="he-IL" smtClean="0"/>
-              <a:t>05 יוני 13</a:t>
+              <a:t>06 יוני 13</a:t>
             </a:fld>
             <a:endParaRPr lang="he-IL"/>
           </a:p>
@@ -2442,6 +2502,18 @@
   <p:clrMapOvr>
     <a:masterClrMapping/>
   </p:clrMapOvr>
+  <mc:AlternateContent xmlns:mc="http://schemas.openxmlformats.org/markup-compatibility/2006" xmlns:p14="http://schemas.microsoft.com/office/powerpoint/2010/main">
+    <mc:Choice Requires="p14">
+      <p:transition spd="slow" p14:dur="1500">
+        <p:split orient="vert"/>
+      </p:transition>
+    </mc:Choice>
+    <mc:Fallback xmlns="">
+      <p:transition spd="slow">
+        <p:split orient="vert"/>
+      </p:transition>
+    </mc:Fallback>
+  </mc:AlternateContent>
 </p:sldLayout>
 </file>
 
@@ -2806,7 +2878,7 @@
           <a:p>
             <a:fld id="{BE1D1E4E-5CEB-4732-8EB9-7B229E1D135F}" type="datetime8">
               <a:rPr lang="he-IL" smtClean="0"/>
-              <a:t>05 יוני 13</a:t>
+              <a:t>06 יוני 13</a:t>
             </a:fld>
             <a:endParaRPr lang="he-IL"/>
           </a:p>
@@ -2863,6 +2935,18 @@
   <p:clrMapOvr>
     <a:masterClrMapping/>
   </p:clrMapOvr>
+  <mc:AlternateContent xmlns:mc="http://schemas.openxmlformats.org/markup-compatibility/2006" xmlns:p14="http://schemas.microsoft.com/office/powerpoint/2010/main">
+    <mc:Choice Requires="p14">
+      <p:transition spd="slow" p14:dur="1500">
+        <p:split orient="vert"/>
+      </p:transition>
+    </mc:Choice>
+    <mc:Fallback xmlns="">
+      <p:transition spd="slow">
+        <p:split orient="vert"/>
+      </p:transition>
+    </mc:Fallback>
+  </mc:AlternateContent>
 </p:sldLayout>
 </file>
 
@@ -2923,7 +3007,7 @@
           <a:p>
             <a:fld id="{4243A61D-1295-4901-A6A1-7E7113DAB7D4}" type="datetime8">
               <a:rPr lang="he-IL" smtClean="0"/>
-              <a:t>05 יוני 13</a:t>
+              <a:t>06 יוני 13</a:t>
             </a:fld>
             <a:endParaRPr lang="he-IL"/>
           </a:p>
@@ -2980,6 +3064,18 @@
   <p:clrMapOvr>
     <a:masterClrMapping/>
   </p:clrMapOvr>
+  <mc:AlternateContent xmlns:mc="http://schemas.openxmlformats.org/markup-compatibility/2006" xmlns:p14="http://schemas.microsoft.com/office/powerpoint/2010/main">
+    <mc:Choice Requires="p14">
+      <p:transition spd="slow" p14:dur="1500">
+        <p:split orient="vert"/>
+      </p:transition>
+    </mc:Choice>
+    <mc:Fallback xmlns="">
+      <p:transition spd="slow">
+        <p:split orient="vert"/>
+      </p:transition>
+    </mc:Fallback>
+  </mc:AlternateContent>
 </p:sldLayout>
 </file>
 
@@ -3017,7 +3113,7 @@
           <a:p>
             <a:fld id="{43419D21-6E49-4C2D-9636-39BF7587D8F7}" type="datetime8">
               <a:rPr lang="he-IL" smtClean="0"/>
-              <a:t>05 יוני 13</a:t>
+              <a:t>06 יוני 13</a:t>
             </a:fld>
             <a:endParaRPr lang="he-IL"/>
           </a:p>
@@ -3074,6 +3170,18 @@
   <p:clrMapOvr>
     <a:masterClrMapping/>
   </p:clrMapOvr>
+  <mc:AlternateContent xmlns:mc="http://schemas.openxmlformats.org/markup-compatibility/2006" xmlns:p14="http://schemas.microsoft.com/office/powerpoint/2010/main">
+    <mc:Choice Requires="p14">
+      <p:transition spd="slow" p14:dur="1500">
+        <p:split orient="vert"/>
+      </p:transition>
+    </mc:Choice>
+    <mc:Fallback xmlns="">
+      <p:transition spd="slow">
+        <p:split orient="vert"/>
+      </p:transition>
+    </mc:Fallback>
+  </mc:AlternateContent>
 </p:sldLayout>
 </file>
 
@@ -3230,7 +3338,7 @@
           <a:p>
             <a:fld id="{60571E62-098E-47B9-A798-8A1448008EF2}" type="datetime8">
               <a:rPr lang="he-IL" smtClean="0"/>
-              <a:t>05 יוני 13</a:t>
+              <a:t>06 יוני 13</a:t>
             </a:fld>
             <a:endParaRPr lang="he-IL"/>
           </a:p>
@@ -3496,6 +3604,18 @@
   <p:clrMapOvr>
     <a:masterClrMapping/>
   </p:clrMapOvr>
+  <mc:AlternateContent xmlns:mc="http://schemas.openxmlformats.org/markup-compatibility/2006" xmlns:p14="http://schemas.microsoft.com/office/powerpoint/2010/main">
+    <mc:Choice Requires="p14">
+      <p:transition spd="slow" p14:dur="1500">
+        <p:split orient="vert"/>
+      </p:transition>
+    </mc:Choice>
+    <mc:Fallback xmlns="">
+      <p:transition spd="slow">
+        <p:split orient="vert"/>
+      </p:transition>
+    </mc:Fallback>
+  </mc:AlternateContent>
 </p:sldLayout>
 </file>
 
@@ -3611,7 +3731,7 @@
           <a:p>
             <a:fld id="{7E946FC9-A20F-4F7D-ACB6-AB02E94EBCC2}" type="datetime8">
               <a:rPr lang="he-IL" smtClean="0"/>
-              <a:t>05 יוני 13</a:t>
+              <a:t>06 יוני 13</a:t>
             </a:fld>
             <a:endParaRPr lang="he-IL"/>
           </a:p>
@@ -3915,6 +4035,18 @@
   <p:clrMapOvr>
     <a:masterClrMapping/>
   </p:clrMapOvr>
+  <mc:AlternateContent xmlns:mc="http://schemas.openxmlformats.org/markup-compatibility/2006" xmlns:p14="http://schemas.microsoft.com/office/powerpoint/2010/main">
+    <mc:Choice Requires="p14">
+      <p:transition spd="slow" p14:dur="1500">
+        <p:split orient="vert"/>
+      </p:transition>
+    </mc:Choice>
+    <mc:Fallback xmlns="">
+      <p:transition spd="slow">
+        <p:split orient="vert"/>
+      </p:transition>
+    </mc:Fallback>
+  </mc:AlternateContent>
 </p:sldLayout>
 </file>
 
@@ -4339,6 +4471,18 @@
     <p:sldLayoutId id="2147483766" r:id="rId10"/>
     <p:sldLayoutId id="2147483767" r:id="rId11"/>
   </p:sldLayoutIdLst>
+  <mc:AlternateContent xmlns:mc="http://schemas.openxmlformats.org/markup-compatibility/2006" xmlns:p14="http://schemas.microsoft.com/office/powerpoint/2010/main">
+    <mc:Choice Requires="p14">
+      <p:transition spd="slow" p14:dur="1500">
+        <p:split orient="vert"/>
+      </p:transition>
+    </mc:Choice>
+    <mc:Fallback xmlns="">
+      <p:transition spd="slow">
+        <p:split orient="vert"/>
+      </p:transition>
+    </mc:Fallback>
+  </mc:AlternateContent>
   <p:timing>
     <p:tnLst>
       <p:par>
@@ -4744,7 +4888,7 @@
           <a:p>
             <a:fld id="{006A0CF1-3064-40A3-8460-60C69A9E289D}" type="datetime8">
               <a:rPr lang="he-IL" smtClean="0"/>
-              <a:t>05 יוני 13</a:t>
+              <a:t>06 יוני 13</a:t>
             </a:fld>
             <a:endParaRPr lang="he-IL"/>
           </a:p>
@@ -4806,12 +4950,16 @@
   <p:clrMapOvr>
     <a:masterClrMapping/>
   </p:clrMapOvr>
-  <mc:AlternateContent xmlns:mc="http://schemas.openxmlformats.org/markup-compatibility/2006">
-    <mc:Choice xmlns:p14="http://schemas.microsoft.com/office/powerpoint/2010/main" Requires="p14">
-      <p:transition spd="slow" p14:dur="2000"/>
+  <mc:AlternateContent xmlns:mc="http://schemas.openxmlformats.org/markup-compatibility/2006" xmlns:p14="http://schemas.microsoft.com/office/powerpoint/2010/main">
+    <mc:Choice Requires="p14">
+      <p:transition spd="slow" p14:dur="1500">
+        <p:split orient="vert"/>
+      </p:transition>
     </mc:Choice>
-    <mc:Fallback>
-      <p:transition spd="slow"/>
+    <mc:Fallback xmlns="">
+      <p:transition spd="slow">
+        <p:split orient="vert"/>
+      </p:transition>
     </mc:Fallback>
   </mc:AlternateContent>
   <p:timing>
@@ -4963,7 +5111,7 @@
           <a:p>
             <a:fld id="{B5A0E853-380A-4D6F-8B19-9CB56BDF37F8}" type="datetime8">
               <a:rPr lang="he-IL" smtClean="0"/>
-              <a:t>05 יוני 13</a:t>
+              <a:t>06 יוני 13</a:t>
             </a:fld>
             <a:endParaRPr lang="he-IL"/>
           </a:p>
@@ -5025,12 +5173,16 @@
   <p:clrMapOvr>
     <a:masterClrMapping/>
   </p:clrMapOvr>
-  <mc:AlternateContent xmlns:mc="http://schemas.openxmlformats.org/markup-compatibility/2006">
-    <mc:Choice xmlns:p14="http://schemas.microsoft.com/office/powerpoint/2010/main" Requires="p14">
-      <p:transition spd="slow" p14:dur="2000"/>
+  <mc:AlternateContent xmlns:mc="http://schemas.openxmlformats.org/markup-compatibility/2006" xmlns:p14="http://schemas.microsoft.com/office/powerpoint/2010/main">
+    <mc:Choice Requires="p14">
+      <p:transition spd="slow" p14:dur="1500">
+        <p:split orient="vert"/>
+      </p:transition>
     </mc:Choice>
-    <mc:Fallback>
-      <p:transition spd="slow"/>
+    <mc:Fallback xmlns="">
+      <p:transition spd="slow">
+        <p:split orient="vert"/>
+      </p:transition>
     </mc:Fallback>
   </mc:AlternateContent>
   <p:timing>
@@ -5175,7 +5327,7 @@
           <a:p>
             <a:fld id="{B5A0E853-380A-4D6F-8B19-9CB56BDF37F8}" type="datetime8">
               <a:rPr lang="he-IL" smtClean="0"/>
-              <a:t>05 יוני 13</a:t>
+              <a:t>06 יוני 13</a:t>
             </a:fld>
             <a:endParaRPr lang="he-IL"/>
           </a:p>
@@ -5237,12 +5389,16 @@
   <p:clrMapOvr>
     <a:masterClrMapping/>
   </p:clrMapOvr>
-  <mc:AlternateContent xmlns:mc="http://schemas.openxmlformats.org/markup-compatibility/2006">
-    <mc:Choice xmlns:p14="http://schemas.microsoft.com/office/powerpoint/2010/main" Requires="p14">
-      <p:transition spd="slow" p14:dur="2000"/>
+  <mc:AlternateContent xmlns:mc="http://schemas.openxmlformats.org/markup-compatibility/2006" xmlns:p14="http://schemas.microsoft.com/office/powerpoint/2010/main">
+    <mc:Choice Requires="p14">
+      <p:transition spd="slow" p14:dur="1500">
+        <p:split orient="vert"/>
+      </p:transition>
     </mc:Choice>
-    <mc:Fallback>
-      <p:transition spd="slow"/>
+    <mc:Fallback xmlns="">
+      <p:transition spd="slow">
+        <p:split orient="vert"/>
+      </p:transition>
     </mc:Fallback>
   </mc:AlternateContent>
   <p:timing>
@@ -5451,12 +5607,16 @@
   <p:clrMapOvr>
     <a:masterClrMapping/>
   </p:clrMapOvr>
-  <mc:AlternateContent xmlns:mc="http://schemas.openxmlformats.org/markup-compatibility/2006">
-    <mc:Choice xmlns:p14="http://schemas.microsoft.com/office/powerpoint/2010/main" Requires="p14">
-      <p:transition spd="slow" p14:dur="2000"/>
+  <mc:AlternateContent xmlns:mc="http://schemas.openxmlformats.org/markup-compatibility/2006" xmlns:p14="http://schemas.microsoft.com/office/powerpoint/2010/main">
+    <mc:Choice Requires="p14">
+      <p:transition spd="slow" p14:dur="1500">
+        <p:split orient="vert"/>
+      </p:transition>
     </mc:Choice>
-    <mc:Fallback>
-      <p:transition spd="slow"/>
+    <mc:Fallback xmlns="">
+      <p:transition spd="slow">
+        <p:split orient="vert"/>
+      </p:transition>
     </mc:Fallback>
   </mc:AlternateContent>
   <p:timing>
@@ -5734,12 +5894,16 @@
   <p:clrMapOvr>
     <a:masterClrMapping/>
   </p:clrMapOvr>
-  <mc:AlternateContent xmlns:mc="http://schemas.openxmlformats.org/markup-compatibility/2006">
-    <mc:Choice xmlns:p14="http://schemas.microsoft.com/office/powerpoint/2010/main" Requires="p14">
-      <p:transition spd="slow" p14:dur="2000"/>
+  <mc:AlternateContent xmlns:mc="http://schemas.openxmlformats.org/markup-compatibility/2006" xmlns:p14="http://schemas.microsoft.com/office/powerpoint/2010/main">
+    <mc:Choice Requires="p14">
+      <p:transition spd="slow" p14:dur="1500">
+        <p:split orient="vert"/>
+      </p:transition>
     </mc:Choice>
-    <mc:Fallback>
-      <p:transition spd="slow"/>
+    <mc:Fallback xmlns="">
+      <p:transition spd="slow">
+        <p:split orient="vert"/>
+      </p:transition>
     </mc:Fallback>
   </mc:AlternateContent>
   <p:timing>
@@ -5809,7 +5973,7 @@
           <a:p>
             <a:fld id="{B5A0E853-380A-4D6F-8B19-9CB56BDF37F8}" type="datetime8">
               <a:rPr lang="he-IL" smtClean="0"/>
-              <a:t>05 יוני 13</a:t>
+              <a:t>06 יוני 13</a:t>
             </a:fld>
             <a:endParaRPr lang="he-IL"/>
           </a:p>
@@ -5883,7 +6047,7 @@
           <a:graphicData uri="http://schemas.openxmlformats.org/presentationml/2006/ole">
             <mc:AlternateContent xmlns:mc="http://schemas.openxmlformats.org/markup-compatibility/2006">
               <mc:Choice xmlns:v="urn:schemas-microsoft-com:vml" Requires="v">
-                <p:oleObj spid="_x0000_s1034" name="Visio" r:id="rId3" imgW="9509760" imgH="6975508" progId="Visio.Drawing.11">
+                <p:oleObj spid="_x0000_s1036" name="Visio" r:id="rId3" imgW="9509760" imgH="6975508" progId="Visio.Drawing.11">
                   <p:embed/>
                 </p:oleObj>
               </mc:Choice>
@@ -6323,6 +6487,18 @@
   <p:clrMapOvr>
     <a:masterClrMapping/>
   </p:clrMapOvr>
+  <mc:AlternateContent xmlns:mc="http://schemas.openxmlformats.org/markup-compatibility/2006" xmlns:p14="http://schemas.microsoft.com/office/powerpoint/2010/main">
+    <mc:Choice Requires="p14">
+      <p:transition spd="slow" p14:dur="1500">
+        <p:split orient="vert"/>
+      </p:transition>
+    </mc:Choice>
+    <mc:Fallback xmlns="">
+      <p:transition spd="slow">
+        <p:split orient="vert"/>
+      </p:transition>
+    </mc:Fallback>
+  </mc:AlternateContent>
   <p:timing>
     <p:tnLst>
       <p:par>
@@ -7416,14 +7592,11 @@
             <a:pPr lvl="1"/>
             <a:r>
               <a:rPr lang="he-IL" dirty="0" smtClean="0"/>
-              <a:t>עדכון פעולות שבוצעו באפליקציה המקומית לשרת הנתונים.</a:t>
-            </a:r>
-          </a:p>
-          <a:p>
-            <a:pPr lvl="1"/>
-            <a:r>
-              <a:rPr lang="he-IL" dirty="0" smtClean="0"/>
-              <a:t>עיצוב ה- </a:t>
+              <a:t>עיצוב </a:t>
+            </a:r>
+            <a:r>
+              <a:rPr lang="he-IL" dirty="0" smtClean="0"/>
+              <a:t>ה- </a:t>
             </a:r>
             <a:r>
               <a:rPr lang="en-US" dirty="0" smtClean="0"/>
@@ -7438,47 +7611,82 @@
             <a:pPr lvl="1"/>
             <a:r>
               <a:rPr lang="he-IL" dirty="0" smtClean="0"/>
-              <a:t>מכשיר בקרה חכם.</a:t>
-            </a:r>
-          </a:p>
-          <a:p>
-            <a:r>
-              <a:rPr lang="he-IL" dirty="0" smtClean="0"/>
-              <a:t>פערים נוספים:</a:t>
+              <a:t>מכשיר </a:t>
+            </a:r>
+            <a:r>
+              <a:rPr lang="he-IL" dirty="0" smtClean="0"/>
+              <a:t>בקרה חכם.</a:t>
+            </a:r>
+          </a:p>
+          <a:p>
+            <a:r>
+              <a:rPr lang="he-IL" dirty="0" smtClean="0"/>
+              <a:t>פערים </a:t>
+            </a:r>
+            <a:r>
+              <a:rPr lang="he-IL" dirty="0" smtClean="0"/>
+              <a:t>נוספים:</a:t>
             </a:r>
           </a:p>
           <a:p>
             <a:pPr lvl="1"/>
             <a:r>
               <a:rPr lang="he-IL" dirty="0" smtClean="0"/>
-              <a:t>הרחבת פעולות על מכשיר חכם.</a:t>
+              <a:t>הרחבת </a:t>
+            </a:r>
+            <a:r>
+              <a:rPr lang="he-IL" dirty="0" smtClean="0"/>
+              <a:t>פעולות על מכשיר חכם.</a:t>
             </a:r>
           </a:p>
           <a:p>
             <a:pPr lvl="1"/>
             <a:r>
               <a:rPr lang="he-IL" dirty="0" smtClean="0"/>
-              <a:t>ניהול מדיניות משתמשים.</a:t>
+              <a:t>ניהול </a:t>
+            </a:r>
+            <a:r>
+              <a:rPr lang="he-IL" dirty="0" smtClean="0"/>
+              <a:t>מדיניות משתמשים.</a:t>
             </a:r>
           </a:p>
           <a:p>
             <a:pPr lvl="1"/>
             <a:r>
               <a:rPr lang="he-IL" dirty="0" smtClean="0"/>
-              <a:t>אבטחת מידע.</a:t>
+              <a:t>אבטחת </a:t>
+            </a:r>
+            <a:r>
+              <a:rPr lang="he-IL" dirty="0" smtClean="0"/>
+              <a:t>מידע.</a:t>
             </a:r>
           </a:p>
           <a:p>
             <a:pPr lvl="1"/>
             <a:r>
               <a:rPr lang="he-IL" dirty="0" smtClean="0"/>
-              <a:t>אפליקציית קצה.</a:t>
-            </a:r>
-          </a:p>
-          <a:p>
-            <a:r>
-              <a:rPr lang="he-IL" dirty="0" smtClean="0"/>
-              <a:t>באגים:</a:t>
+              <a:t>אפליקציית </a:t>
+            </a:r>
+            <a:r>
+              <a:rPr lang="he-IL" dirty="0" smtClean="0"/>
+              <a:t>קצה.</a:t>
+            </a:r>
+          </a:p>
+          <a:p>
+            <a:r>
+              <a:rPr lang="he-IL" dirty="0" smtClean="0"/>
+              <a:t>באגים</a:t>
+            </a:r>
+            <a:r>
+              <a:rPr lang="he-IL" dirty="0" smtClean="0"/>
+              <a:t>:</a:t>
+            </a:r>
+          </a:p>
+          <a:p>
+            <a:pPr lvl="1"/>
+            <a:r>
+              <a:rPr lang="he-IL" dirty="0" smtClean="0"/>
+              <a:t>עדכון פעולות שבוצעו באפליקציה המקומית לשרת הנתונים ולהיפך.</a:t>
             </a:r>
           </a:p>
           <a:p>
@@ -7504,7 +7712,7 @@
           <a:p>
             <a:fld id="{B5A0E853-380A-4D6F-8B19-9CB56BDF37F8}" type="datetime8">
               <a:rPr lang="he-IL" smtClean="0"/>
-              <a:t>05 יוני 13</a:t>
+              <a:t>06 יוני 13</a:t>
             </a:fld>
             <a:endParaRPr lang="he-IL"/>
           </a:p>
@@ -7566,6 +7774,18 @@
   <p:clrMapOvr>
     <a:masterClrMapping/>
   </p:clrMapOvr>
+  <mc:AlternateContent xmlns:mc="http://schemas.openxmlformats.org/markup-compatibility/2006" xmlns:p14="http://schemas.microsoft.com/office/powerpoint/2010/main">
+    <mc:Choice Requires="p14">
+      <p:transition spd="slow" p14:dur="1500">
+        <p:split orient="vert"/>
+      </p:transition>
+    </mc:Choice>
+    <mc:Fallback xmlns="">
+      <p:transition spd="slow">
+        <p:split orient="vert"/>
+      </p:transition>
+    </mc:Fallback>
+  </mc:AlternateContent>
   <p:timing>
     <p:tnLst>
       <p:par>
@@ -7798,6 +8018,18 @@
   <p:clrMapOvr>
     <a:masterClrMapping/>
   </p:clrMapOvr>
+  <mc:AlternateContent xmlns:mc="http://schemas.openxmlformats.org/markup-compatibility/2006" xmlns:p14="http://schemas.microsoft.com/office/powerpoint/2010/main">
+    <mc:Choice Requires="p14">
+      <p:transition spd="slow" p14:dur="1500">
+        <p:split orient="vert"/>
+      </p:transition>
+    </mc:Choice>
+    <mc:Fallback xmlns="">
+      <p:transition spd="slow">
+        <p:split orient="vert"/>
+      </p:transition>
+    </mc:Fallback>
+  </mc:AlternateContent>
   <p:timing>
     <p:tnLst>
       <p:par>
@@ -7956,6 +8188,18 @@
   <p:clrMapOvr>
     <a:masterClrMapping/>
   </p:clrMapOvr>
+  <mc:AlternateContent xmlns:mc="http://schemas.openxmlformats.org/markup-compatibility/2006" xmlns:p14="http://schemas.microsoft.com/office/powerpoint/2010/main">
+    <mc:Choice Requires="p14">
+      <p:transition spd="slow" p14:dur="1500">
+        <p:split orient="vert"/>
+      </p:transition>
+    </mc:Choice>
+    <mc:Fallback xmlns="">
+      <p:transition spd="slow">
+        <p:split orient="vert"/>
+      </p:transition>
+    </mc:Fallback>
+  </mc:AlternateContent>
   <p:timing>
     <p:tnLst>
       <p:par>
@@ -8106,6 +8350,18 @@
   <p:clrMapOvr>
     <a:masterClrMapping/>
   </p:clrMapOvr>
+  <mc:AlternateContent xmlns:mc="http://schemas.openxmlformats.org/markup-compatibility/2006" xmlns:p14="http://schemas.microsoft.com/office/powerpoint/2010/main">
+    <mc:Choice Requires="p14">
+      <p:transition spd="slow" p14:dur="1500">
+        <p:split orient="vert"/>
+      </p:transition>
+    </mc:Choice>
+    <mc:Fallback xmlns="">
+      <p:transition spd="slow">
+        <p:split orient="vert"/>
+      </p:transition>
+    </mc:Fallback>
+  </mc:AlternateContent>
   <p:timing>
     <p:tnLst>
       <p:par>
@@ -8216,7 +8472,7 @@
           <a:p>
             <a:fld id="{B5A0E853-380A-4D6F-8B19-9CB56BDF37F8}" type="datetime8">
               <a:rPr lang="he-IL" smtClean="0"/>
-              <a:t>05 יוני 13</a:t>
+              <a:t>06 יוני 13</a:t>
             </a:fld>
             <a:endParaRPr lang="he-IL"/>
           </a:p>
@@ -8278,12 +8534,16 @@
   <p:clrMapOvr>
     <a:masterClrMapping/>
   </p:clrMapOvr>
-  <mc:AlternateContent xmlns:mc="http://schemas.openxmlformats.org/markup-compatibility/2006">
-    <mc:Choice xmlns:p14="http://schemas.microsoft.com/office/powerpoint/2010/main" Requires="p14">
-      <p:transition spd="slow" p14:dur="2000"/>
+  <mc:AlternateContent xmlns:mc="http://schemas.openxmlformats.org/markup-compatibility/2006" xmlns:p14="http://schemas.microsoft.com/office/powerpoint/2010/main">
+    <mc:Choice Requires="p14">
+      <p:transition spd="slow" p14:dur="1500">
+        <p:split orient="vert"/>
+      </p:transition>
     </mc:Choice>
-    <mc:Fallback>
-      <p:transition spd="slow"/>
+    <mc:Fallback xmlns="">
+      <p:transition spd="slow">
+        <p:split orient="vert"/>
+      </p:transition>
     </mc:Fallback>
   </mc:AlternateContent>
   <p:timing>
@@ -8465,9 +8725,6 @@
               </a:rPr>
               <a:t>V1.0</a:t>
             </a:r>
-            <a:endParaRPr lang="en-US" dirty="0" smtClean="0">
-              <a:cs typeface="David" pitchFamily="2" charset="-79"/>
-            </a:endParaRPr>
           </a:p>
           <a:p>
             <a:pPr>
@@ -8493,6 +8750,18 @@
   <p:clrMapOvr>
     <a:masterClrMapping/>
   </p:clrMapOvr>
+  <mc:AlternateContent xmlns:mc="http://schemas.openxmlformats.org/markup-compatibility/2006" xmlns:p14="http://schemas.microsoft.com/office/powerpoint/2010/main">
+    <mc:Choice Requires="p14">
+      <p:transition spd="slow" p14:dur="1500">
+        <p:split orient="vert"/>
+      </p:transition>
+    </mc:Choice>
+    <mc:Fallback xmlns="">
+      <p:transition spd="slow">
+        <p:split orient="vert"/>
+      </p:transition>
+    </mc:Fallback>
+  </mc:AlternateContent>
   <p:timing>
     <p:tnLst>
       <p:par>
@@ -8692,7 +8961,7 @@
           <a:p>
             <a:fld id="{B5A0E853-380A-4D6F-8B19-9CB56BDF37F8}" type="datetime8">
               <a:rPr lang="he-IL" smtClean="0"/>
-              <a:t>05 יוני 13</a:t>
+              <a:t>06 יוני 13</a:t>
             </a:fld>
             <a:endParaRPr lang="he-IL"/>
           </a:p>
@@ -8754,12 +9023,16 @@
   <p:clrMapOvr>
     <a:masterClrMapping/>
   </p:clrMapOvr>
-  <mc:AlternateContent xmlns:mc="http://schemas.openxmlformats.org/markup-compatibility/2006">
-    <mc:Choice xmlns:p14="http://schemas.microsoft.com/office/powerpoint/2010/main" Requires="p14">
-      <p:transition spd="slow" p14:dur="2000"/>
+  <mc:AlternateContent xmlns:mc="http://schemas.openxmlformats.org/markup-compatibility/2006" xmlns:p14="http://schemas.microsoft.com/office/powerpoint/2010/main">
+    <mc:Choice Requires="p14">
+      <p:transition spd="slow" p14:dur="1500">
+        <p:split orient="vert"/>
+      </p:transition>
     </mc:Choice>
-    <mc:Fallback>
-      <p:transition spd="slow"/>
+    <mc:Fallback xmlns="">
+      <p:transition spd="slow">
+        <p:split orient="vert"/>
+      </p:transition>
     </mc:Fallback>
   </mc:AlternateContent>
   <p:timing>
@@ -9204,13 +9477,7 @@
                         <a:rPr lang="he-IL" dirty="0" smtClean="0">
                           <a:cs typeface="David" pitchFamily="2" charset="-79"/>
                         </a:rPr>
-                        <a:t>תחילת פיתוח שלב </a:t>
-                      </a:r>
-                      <a:r>
-                        <a:rPr lang="he-IL" dirty="0" smtClean="0">
-                          <a:cs typeface="David" pitchFamily="2" charset="-79"/>
-                        </a:rPr>
-                        <a:t>3</a:t>
+                        <a:t>תחילת פיתוח שלב 3</a:t>
                       </a:r>
                       <a:endParaRPr lang="he-IL" dirty="0"/>
                     </a:p>
@@ -9259,13 +9526,7 @@
                         <a:rPr lang="he-IL" dirty="0" smtClean="0">
                           <a:cs typeface="David" pitchFamily="2" charset="-79"/>
                         </a:rPr>
-                        <a:t>תחילת בדיקות שלב </a:t>
-                      </a:r>
-                      <a:r>
-                        <a:rPr lang="he-IL" dirty="0" smtClean="0">
-                          <a:cs typeface="David" pitchFamily="2" charset="-79"/>
-                        </a:rPr>
-                        <a:t>3</a:t>
+                        <a:t>תחילת בדיקות שלב 3</a:t>
                       </a:r>
                       <a:endParaRPr lang="he-IL" dirty="0"/>
                     </a:p>
@@ -9314,13 +9575,7 @@
                         <a:rPr lang="he-IL" dirty="0" smtClean="0">
                           <a:cs typeface="David" pitchFamily="2" charset="-79"/>
                         </a:rPr>
-                        <a:t>תיקונים שלב </a:t>
-                      </a:r>
-                      <a:r>
-                        <a:rPr lang="he-IL" dirty="0" smtClean="0">
-                          <a:cs typeface="David" pitchFamily="2" charset="-79"/>
-                        </a:rPr>
-                        <a:t>3</a:t>
+                        <a:t>תיקונים שלב 3</a:t>
                       </a:r>
                       <a:endParaRPr lang="he-IL" dirty="0"/>
                     </a:p>
@@ -9369,13 +9624,7 @@
                         <a:rPr lang="he-IL" dirty="0" smtClean="0">
                           <a:cs typeface="David" pitchFamily="2" charset="-79"/>
                         </a:rPr>
-                        <a:t>סיום שלב </a:t>
-                      </a:r>
-                      <a:r>
-                        <a:rPr lang="he-IL" dirty="0" smtClean="0">
-                          <a:cs typeface="David" pitchFamily="2" charset="-79"/>
-                        </a:rPr>
-                        <a:t>3</a:t>
+                        <a:t>סיום שלב 3</a:t>
                       </a:r>
                       <a:endParaRPr lang="he-IL" dirty="0"/>
                     </a:p>
@@ -9427,6 +9676,18 @@
   <p:clrMapOvr>
     <a:masterClrMapping/>
   </p:clrMapOvr>
+  <mc:AlternateContent xmlns:mc="http://schemas.openxmlformats.org/markup-compatibility/2006" xmlns:p14="http://schemas.microsoft.com/office/powerpoint/2010/main">
+    <mc:Choice Requires="p14">
+      <p:transition spd="slow" p14:dur="1500">
+        <p:split orient="vert"/>
+      </p:transition>
+    </mc:Choice>
+    <mc:Fallback xmlns="">
+      <p:transition spd="slow">
+        <p:split orient="vert"/>
+      </p:transition>
+    </mc:Fallback>
+  </mc:AlternateContent>
   <p:timing>
     <p:tnLst>
       <p:par>
@@ -9551,7 +9812,7 @@
           <a:p>
             <a:fld id="{B5A0E853-380A-4D6F-8B19-9CB56BDF37F8}" type="datetime8">
               <a:rPr lang="he-IL" smtClean="0"/>
-              <a:t>05 יוני 13</a:t>
+              <a:t>06 יוני 13</a:t>
             </a:fld>
             <a:endParaRPr lang="he-IL"/>
           </a:p>
@@ -9613,12 +9874,16 @@
   <p:clrMapOvr>
     <a:masterClrMapping/>
   </p:clrMapOvr>
-  <mc:AlternateContent xmlns:mc="http://schemas.openxmlformats.org/markup-compatibility/2006">
-    <mc:Choice xmlns:p14="http://schemas.microsoft.com/office/powerpoint/2010/main" Requires="p14">
-      <p:transition spd="slow" p14:dur="2000"/>
+  <mc:AlternateContent xmlns:mc="http://schemas.openxmlformats.org/markup-compatibility/2006" xmlns:p14="http://schemas.microsoft.com/office/powerpoint/2010/main">
+    <mc:Choice Requires="p14">
+      <p:transition spd="slow" p14:dur="1500">
+        <p:split orient="vert"/>
+      </p:transition>
     </mc:Choice>
-    <mc:Fallback>
-      <p:transition spd="slow"/>
+    <mc:Fallback xmlns="">
+      <p:transition spd="slow">
+        <p:split orient="vert"/>
+      </p:transition>
     </mc:Fallback>
   </mc:AlternateContent>
   <p:timing>
@@ -9688,7 +9953,7 @@
           <a:p>
             <a:fld id="{B5A0E853-380A-4D6F-8B19-9CB56BDF37F8}" type="datetime8">
               <a:rPr lang="he-IL" smtClean="0"/>
-              <a:t>05 יוני 13</a:t>
+              <a:t>06 יוני 13</a:t>
             </a:fld>
             <a:endParaRPr lang="he-IL"/>
           </a:p>
@@ -9762,7 +10027,7 @@
           <a:graphicData uri="http://schemas.openxmlformats.org/presentationml/2006/ole">
             <mc:AlternateContent xmlns:mc="http://schemas.openxmlformats.org/markup-compatibility/2006">
               <mc:Choice xmlns:v="urn:schemas-microsoft-com:vml" Requires="v">
-                <p:oleObj spid="_x0000_s2055" name="Visio" r:id="rId3" imgW="9509760" imgH="6975508" progId="Visio.Drawing.11">
+                <p:oleObj spid="_x0000_s2057" name="Visio" r:id="rId3" imgW="9509760" imgH="6975508" progId="Visio.Drawing.11">
                   <p:embed/>
                 </p:oleObj>
               </mc:Choice>
@@ -9807,6 +10072,18 @@
   <p:clrMapOvr>
     <a:masterClrMapping/>
   </p:clrMapOvr>
+  <mc:AlternateContent xmlns:mc="http://schemas.openxmlformats.org/markup-compatibility/2006" xmlns:p14="http://schemas.microsoft.com/office/powerpoint/2010/main">
+    <mc:Choice Requires="p14">
+      <p:transition spd="slow" p14:dur="1500">
+        <p:split orient="vert"/>
+      </p:transition>
+    </mc:Choice>
+    <mc:Fallback xmlns="">
+      <p:transition spd="slow">
+        <p:split orient="vert"/>
+      </p:transition>
+    </mc:Fallback>
+  </mc:AlternateContent>
   <p:timing>
     <p:tnLst>
       <p:par>
@@ -9970,7 +10247,7 @@
           <a:p>
             <a:fld id="{B5A0E853-380A-4D6F-8B19-9CB56BDF37F8}" type="datetime8">
               <a:rPr lang="he-IL" smtClean="0"/>
-              <a:t>05 יוני 13</a:t>
+              <a:t>06 יוני 13</a:t>
             </a:fld>
             <a:endParaRPr lang="he-IL"/>
           </a:p>
@@ -10032,6 +10309,18 @@
   <p:clrMapOvr>
     <a:masterClrMapping/>
   </p:clrMapOvr>
+  <mc:AlternateContent xmlns:mc="http://schemas.openxmlformats.org/markup-compatibility/2006" xmlns:p14="http://schemas.microsoft.com/office/powerpoint/2010/main">
+    <mc:Choice Requires="p14">
+      <p:transition spd="slow" p14:dur="1500">
+        <p:split orient="vert"/>
+      </p:transition>
+    </mc:Choice>
+    <mc:Fallback xmlns="">
+      <p:transition spd="slow">
+        <p:split orient="vert"/>
+      </p:transition>
+    </mc:Fallback>
+  </mc:AlternateContent>
   <p:timing>
     <p:tnLst>
       <p:par>
@@ -10188,7 +10477,7 @@
           <a:p>
             <a:fld id="{B5A0E853-380A-4D6F-8B19-9CB56BDF37F8}" type="datetime8">
               <a:rPr lang="he-IL" smtClean="0"/>
-              <a:t>05 יוני 13</a:t>
+              <a:t>06 יוני 13</a:t>
             </a:fld>
             <a:endParaRPr lang="he-IL"/>
           </a:p>
@@ -10250,6 +10539,18 @@
   <p:clrMapOvr>
     <a:masterClrMapping/>
   </p:clrMapOvr>
+  <mc:AlternateContent xmlns:mc="http://schemas.openxmlformats.org/markup-compatibility/2006" xmlns:p14="http://schemas.microsoft.com/office/powerpoint/2010/main">
+    <mc:Choice Requires="p14">
+      <p:transition spd="slow" p14:dur="1500">
+        <p:split orient="vert"/>
+      </p:transition>
+    </mc:Choice>
+    <mc:Fallback xmlns="">
+      <p:transition spd="slow">
+        <p:split orient="vert"/>
+      </p:transition>
+    </mc:Fallback>
+  </mc:AlternateContent>
   <p:timing>
     <p:tnLst>
       <p:par>

</xml_diff>